<commit_message>
Docs: Updates of the Tutorial documentation (#1089)
* updates markdown numbered list to kramdown syntax

* updates the top image of the MathComponent tutorial

* adds location of the tutorial code

* adds instructions to access the ground system if fprime is setup in a docker container on Windows

Co-authored-by: Johan Bertrand <johan@madeinspaceeurope.com>
</commit_message>
<xml_diff>
--- a/docs/Tutorials/MathComponent/img/CompDiag.pptx
+++ b/docs/Tutorials/MathComponent/img/CompDiag.pptx
@@ -104,6 +104,11 @@
       </a:defRPr>
     </a:lvl9pPr>
   </p:defaultTextStyle>
+  <p:extLst>
+    <p:ext uri="{EFAFB233-063F-42B5-8137-9DF3F51BA10A}">
+      <p15:sldGuideLst xmlns:p15="http://schemas.microsoft.com/office/powerpoint/2012/main"/>
+    </p:ext>
+  </p:extLst>
 </p:presentation>
 </file>
 
@@ -254,7 +259,7 @@
           <a:p>
             <a:fld id="{90712CB0-1668-40F8-AEB2-B5E0E09F5634}" type="datetimeFigureOut">
               <a:rPr lang="en-US" smtClean="0"/>
-              <a:t>6/20/2018</a:t>
+              <a:t>10/28/2021</a:t>
             </a:fld>
             <a:endParaRPr lang="en-US"/>
           </a:p>
@@ -308,7 +313,7 @@
           <a:p>
             <a:fld id="{B767925C-3D36-4F59-9822-F1B9436445EE}" type="slidenum">
               <a:rPr lang="en-US" smtClean="0"/>
-              <a:t>‹#›</a:t>
+              <a:t>‹N°›</a:t>
             </a:fld>
             <a:endParaRPr lang="en-US"/>
           </a:p>
@@ -452,7 +457,7 @@
           <a:p>
             <a:fld id="{90712CB0-1668-40F8-AEB2-B5E0E09F5634}" type="datetimeFigureOut">
               <a:rPr lang="en-US" smtClean="0"/>
-              <a:t>6/20/2018</a:t>
+              <a:t>10/28/2021</a:t>
             </a:fld>
             <a:endParaRPr lang="en-US"/>
           </a:p>
@@ -506,7 +511,7 @@
           <a:p>
             <a:fld id="{B767925C-3D36-4F59-9822-F1B9436445EE}" type="slidenum">
               <a:rPr lang="en-US" smtClean="0"/>
-              <a:t>‹#›</a:t>
+              <a:t>‹N°›</a:t>
             </a:fld>
             <a:endParaRPr lang="en-US"/>
           </a:p>
@@ -660,7 +665,7 @@
           <a:p>
             <a:fld id="{90712CB0-1668-40F8-AEB2-B5E0E09F5634}" type="datetimeFigureOut">
               <a:rPr lang="en-US" smtClean="0"/>
-              <a:t>6/20/2018</a:t>
+              <a:t>10/28/2021</a:t>
             </a:fld>
             <a:endParaRPr lang="en-US"/>
           </a:p>
@@ -714,7 +719,7 @@
           <a:p>
             <a:fld id="{B767925C-3D36-4F59-9822-F1B9436445EE}" type="slidenum">
               <a:rPr lang="en-US" smtClean="0"/>
-              <a:t>‹#›</a:t>
+              <a:t>‹N°›</a:t>
             </a:fld>
             <a:endParaRPr lang="en-US"/>
           </a:p>
@@ -858,7 +863,7 @@
           <a:p>
             <a:fld id="{90712CB0-1668-40F8-AEB2-B5E0E09F5634}" type="datetimeFigureOut">
               <a:rPr lang="en-US" smtClean="0"/>
-              <a:t>6/20/2018</a:t>
+              <a:t>10/28/2021</a:t>
             </a:fld>
             <a:endParaRPr lang="en-US"/>
           </a:p>
@@ -912,7 +917,7 @@
           <a:p>
             <a:fld id="{B767925C-3D36-4F59-9822-F1B9436445EE}" type="slidenum">
               <a:rPr lang="en-US" smtClean="0"/>
-              <a:t>‹#›</a:t>
+              <a:t>‹N°›</a:t>
             </a:fld>
             <a:endParaRPr lang="en-US"/>
           </a:p>
@@ -1133,7 +1138,7 @@
           <a:p>
             <a:fld id="{90712CB0-1668-40F8-AEB2-B5E0E09F5634}" type="datetimeFigureOut">
               <a:rPr lang="en-US" smtClean="0"/>
-              <a:t>6/20/2018</a:t>
+              <a:t>10/28/2021</a:t>
             </a:fld>
             <a:endParaRPr lang="en-US"/>
           </a:p>
@@ -1187,7 +1192,7 @@
           <a:p>
             <a:fld id="{B767925C-3D36-4F59-9822-F1B9436445EE}" type="slidenum">
               <a:rPr lang="en-US" smtClean="0"/>
-              <a:t>‹#›</a:t>
+              <a:t>‹N°›</a:t>
             </a:fld>
             <a:endParaRPr lang="en-US"/>
           </a:p>
@@ -1398,7 +1403,7 @@
           <a:p>
             <a:fld id="{90712CB0-1668-40F8-AEB2-B5E0E09F5634}" type="datetimeFigureOut">
               <a:rPr lang="en-US" smtClean="0"/>
-              <a:t>6/20/2018</a:t>
+              <a:t>10/28/2021</a:t>
             </a:fld>
             <a:endParaRPr lang="en-US"/>
           </a:p>
@@ -1452,7 +1457,7 @@
           <a:p>
             <a:fld id="{B767925C-3D36-4F59-9822-F1B9436445EE}" type="slidenum">
               <a:rPr lang="en-US" smtClean="0"/>
-              <a:t>‹#›</a:t>
+              <a:t>‹N°›</a:t>
             </a:fld>
             <a:endParaRPr lang="en-US"/>
           </a:p>
@@ -1810,7 +1815,7 @@
           <a:p>
             <a:fld id="{90712CB0-1668-40F8-AEB2-B5E0E09F5634}" type="datetimeFigureOut">
               <a:rPr lang="en-US" smtClean="0"/>
-              <a:t>6/20/2018</a:t>
+              <a:t>10/28/2021</a:t>
             </a:fld>
             <a:endParaRPr lang="en-US"/>
           </a:p>
@@ -1864,7 +1869,7 @@
           <a:p>
             <a:fld id="{B767925C-3D36-4F59-9822-F1B9436445EE}" type="slidenum">
               <a:rPr lang="en-US" smtClean="0"/>
-              <a:t>‹#›</a:t>
+              <a:t>‹N°›</a:t>
             </a:fld>
             <a:endParaRPr lang="en-US"/>
           </a:p>
@@ -1951,7 +1956,7 @@
           <a:p>
             <a:fld id="{90712CB0-1668-40F8-AEB2-B5E0E09F5634}" type="datetimeFigureOut">
               <a:rPr lang="en-US" smtClean="0"/>
-              <a:t>6/20/2018</a:t>
+              <a:t>10/28/2021</a:t>
             </a:fld>
             <a:endParaRPr lang="en-US"/>
           </a:p>
@@ -2005,7 +2010,7 @@
           <a:p>
             <a:fld id="{B767925C-3D36-4F59-9822-F1B9436445EE}" type="slidenum">
               <a:rPr lang="en-US" smtClean="0"/>
-              <a:t>‹#›</a:t>
+              <a:t>‹N°›</a:t>
             </a:fld>
             <a:endParaRPr lang="en-US"/>
           </a:p>
@@ -2064,7 +2069,7 @@
           <a:p>
             <a:fld id="{90712CB0-1668-40F8-AEB2-B5E0E09F5634}" type="datetimeFigureOut">
               <a:rPr lang="en-US" smtClean="0"/>
-              <a:t>6/20/2018</a:t>
+              <a:t>10/28/2021</a:t>
             </a:fld>
             <a:endParaRPr lang="en-US"/>
           </a:p>
@@ -2118,7 +2123,7 @@
           <a:p>
             <a:fld id="{B767925C-3D36-4F59-9822-F1B9436445EE}" type="slidenum">
               <a:rPr lang="en-US" smtClean="0"/>
-              <a:t>‹#›</a:t>
+              <a:t>‹N°›</a:t>
             </a:fld>
             <a:endParaRPr lang="en-US"/>
           </a:p>
@@ -2375,7 +2380,7 @@
           <a:p>
             <a:fld id="{90712CB0-1668-40F8-AEB2-B5E0E09F5634}" type="datetimeFigureOut">
               <a:rPr lang="en-US" smtClean="0"/>
-              <a:t>6/20/2018</a:t>
+              <a:t>10/28/2021</a:t>
             </a:fld>
             <a:endParaRPr lang="en-US"/>
           </a:p>
@@ -2429,7 +2434,7 @@
           <a:p>
             <a:fld id="{B767925C-3D36-4F59-9822-F1B9436445EE}" type="slidenum">
               <a:rPr lang="en-US" smtClean="0"/>
-              <a:t>‹#›</a:t>
+              <a:t>‹N°›</a:t>
             </a:fld>
             <a:endParaRPr lang="en-US"/>
           </a:p>
@@ -2663,7 +2668,7 @@
           <a:p>
             <a:fld id="{90712CB0-1668-40F8-AEB2-B5E0E09F5634}" type="datetimeFigureOut">
               <a:rPr lang="en-US" smtClean="0"/>
-              <a:t>6/20/2018</a:t>
+              <a:t>10/28/2021</a:t>
             </a:fld>
             <a:endParaRPr lang="en-US"/>
           </a:p>
@@ -2717,7 +2722,7 @@
           <a:p>
             <a:fld id="{B767925C-3D36-4F59-9822-F1B9436445EE}" type="slidenum">
               <a:rPr lang="en-US" smtClean="0"/>
-              <a:t>‹#›</a:t>
+              <a:t>‹N°›</a:t>
             </a:fld>
             <a:endParaRPr lang="en-US"/>
           </a:p>
@@ -2904,7 +2909,7 @@
           <a:p>
             <a:fld id="{90712CB0-1668-40F8-AEB2-B5E0E09F5634}" type="datetimeFigureOut">
               <a:rPr lang="en-US" smtClean="0"/>
-              <a:t>6/20/2018</a:t>
+              <a:t>10/28/2021</a:t>
             </a:fld>
             <a:endParaRPr lang="en-US"/>
           </a:p>
@@ -2994,7 +2999,7 @@
           <a:p>
             <a:fld id="{B767925C-3D36-4F59-9822-F1B9436445EE}" type="slidenum">
               <a:rPr lang="en-US" smtClean="0"/>
-              <a:t>‹#›</a:t>
+              <a:t>‹N°›</a:t>
             </a:fld>
             <a:endParaRPr lang="en-US"/>
           </a:p>
@@ -3342,9 +3347,74 @@
             <a:avLst/>
           </a:prstGeom>
           <a:solidFill>
-            <a:schemeClr val="accent3">
-              <a:lumMod val="60000"/>
-              <a:lumOff val="40000"/>
+            <a:schemeClr val="accent2"/>
+          </a:solidFill>
+          <a:effectLst>
+            <a:outerShdw blurRad="50800" dist="38100" dir="2700000" algn="tl" rotWithShape="0">
+              <a:prstClr val="black">
+                <a:alpha val="40000"/>
+              </a:prstClr>
+            </a:outerShdw>
+          </a:effectLst>
+          <a:scene3d>
+            <a:camera prst="orthographicFront"/>
+            <a:lightRig rig="threePt" dir="t"/>
+          </a:scene3d>
+          <a:sp3d>
+            <a:bevelT/>
+          </a:sp3d>
+        </p:spPr>
+        <p:style>
+          <a:lnRef idx="2">
+            <a:schemeClr val="accent1">
+              <a:shade val="50000"/>
+            </a:schemeClr>
+          </a:lnRef>
+          <a:fillRef idx="1">
+            <a:schemeClr val="accent1"/>
+          </a:fillRef>
+          <a:effectRef idx="0">
+            <a:schemeClr val="accent1"/>
+          </a:effectRef>
+          <a:fontRef idx="minor">
+            <a:schemeClr val="lt1"/>
+          </a:fontRef>
+        </p:style>
+        <p:txBody>
+          <a:bodyPr rtlCol="0" anchor="ctr"/>
+          <a:lstStyle/>
+          <a:p>
+            <a:pPr algn="ctr"/>
+            <a:r>
+              <a:rPr lang="en-US" dirty="0"/>
+              <a:t>MathSender</a:t>
+            </a:r>
+          </a:p>
+        </p:txBody>
+      </p:sp>
+      <p:sp>
+        <p:nvSpPr>
+          <p:cNvPr id="6" name="Rectangle: Rounded Corners 5">
+            <a:extLst>
+              <a:ext uri="{FF2B5EF4-FFF2-40B4-BE49-F238E27FC236}">
+                <a16:creationId xmlns:a16="http://schemas.microsoft.com/office/drawing/2014/main" id="{D2169480-DB4E-4CE4-B562-3350291C8926}"/>
+              </a:ext>
+            </a:extLst>
+          </p:cNvPr>
+          <p:cNvSpPr/>
+          <p:nvPr/>
+        </p:nvSpPr>
+        <p:spPr>
+          <a:xfrm>
+            <a:off x="7016261" y="2368061"/>
+            <a:ext cx="2192215" cy="1781908"/>
+          </a:xfrm>
+          <a:prstGeom prst="roundRect">
+            <a:avLst/>
+          </a:prstGeom>
+          <a:solidFill>
+            <a:schemeClr val="accent1">
+              <a:lumMod val="75000"/>
             </a:schemeClr>
           </a:solidFill>
           <a:effectLst>
@@ -3384,470 +3454,421 @@
           <a:p>
             <a:pPr algn="ctr"/>
             <a:r>
-              <a:rPr lang="en-US" dirty="0" err="1"/>
-              <a:t>MathSender</a:t>
-            </a:r>
-            <a:endParaRPr lang="en-US" dirty="0"/>
-          </a:p>
-        </p:txBody>
-      </p:sp>
-      <p:sp>
-        <p:nvSpPr>
-          <p:cNvPr id="6" name="Rectangle: Rounded Corners 5">
-            <a:extLst>
-              <a:ext uri="{FF2B5EF4-FFF2-40B4-BE49-F238E27FC236}">
-                <a16:creationId xmlns:a16="http://schemas.microsoft.com/office/drawing/2014/main" id="{D2169480-DB4E-4CE4-B562-3350291C8926}"/>
-              </a:ext>
-            </a:extLst>
-          </p:cNvPr>
-          <p:cNvSpPr/>
+              <a:rPr lang="en-US" dirty="0"/>
+              <a:t>MathReceiver</a:t>
+            </a:r>
+          </a:p>
+        </p:txBody>
+      </p:sp>
+      <p:grpSp>
+        <p:nvGrpSpPr>
+          <p:cNvPr id="3" name="Groupe 2">
+            <a:extLst>
+              <a:ext uri="{FF2B5EF4-FFF2-40B4-BE49-F238E27FC236}">
+                <a16:creationId xmlns:a16="http://schemas.microsoft.com/office/drawing/2014/main" id="{149ABFAB-70B3-43D7-A94C-E2D771099B40}"/>
+              </a:ext>
+            </a:extLst>
+          </p:cNvPr>
+          <p:cNvGrpSpPr/>
           <p:nvPr/>
-        </p:nvSpPr>
-        <p:spPr>
+        </p:nvGrpSpPr>
+        <p:grpSpPr>
           <a:xfrm>
-            <a:off x="7016261" y="2368061"/>
-            <a:ext cx="2192215" cy="1781908"/>
+            <a:off x="4519246" y="2460999"/>
+            <a:ext cx="2596662" cy="1365794"/>
+            <a:chOff x="4525107" y="2362145"/>
+            <a:chExt cx="2596662" cy="1365794"/>
           </a:xfrm>
-          <a:prstGeom prst="roundRect">
-            <a:avLst/>
-          </a:prstGeom>
-          <a:solidFill>
-            <a:schemeClr val="accent1">
-              <a:lumMod val="40000"/>
-              <a:lumOff val="60000"/>
-            </a:schemeClr>
-          </a:solidFill>
-          <a:effectLst>
-            <a:outerShdw blurRad="50800" dist="38100" dir="2700000" algn="tl" rotWithShape="0">
-              <a:prstClr val="black">
-                <a:alpha val="40000"/>
-              </a:prstClr>
-            </a:outerShdw>
-          </a:effectLst>
-          <a:scene3d>
-            <a:camera prst="orthographicFront"/>
-            <a:lightRig rig="threePt" dir="t"/>
-          </a:scene3d>
-          <a:sp3d>
-            <a:bevelT/>
-          </a:sp3d>
-        </p:spPr>
-        <p:style>
-          <a:lnRef idx="2">
-            <a:schemeClr val="accent1">
-              <a:shade val="50000"/>
-            </a:schemeClr>
-          </a:lnRef>
-          <a:fillRef idx="1">
-            <a:schemeClr val="accent1"/>
-          </a:fillRef>
-          <a:effectRef idx="0">
-            <a:schemeClr val="accent1"/>
-          </a:effectRef>
-          <a:fontRef idx="minor">
-            <a:schemeClr val="lt1"/>
-          </a:fontRef>
-        </p:style>
-        <p:txBody>
-          <a:bodyPr rtlCol="0" anchor="ctr"/>
-          <a:lstStyle/>
-          <a:p>
-            <a:pPr algn="ctr"/>
-            <a:r>
-              <a:rPr lang="en-US" dirty="0" err="1"/>
-              <a:t>MathReceiver</a:t>
-            </a:r>
-            <a:endParaRPr lang="en-US" dirty="0"/>
-          </a:p>
-        </p:txBody>
-      </p:sp>
-      <p:sp>
-        <p:nvSpPr>
-          <p:cNvPr id="8" name="Rectangle: Rounded Corners 7">
-            <a:extLst>
-              <a:ext uri="{FF2B5EF4-FFF2-40B4-BE49-F238E27FC236}">
-                <a16:creationId xmlns:a16="http://schemas.microsoft.com/office/drawing/2014/main" id="{CF590F33-0447-43A3-A608-F8719420EB17}"/>
-              </a:ext>
-            </a:extLst>
-          </p:cNvPr>
-          <p:cNvSpPr/>
-          <p:nvPr/>
-        </p:nvSpPr>
-        <p:spPr>
-          <a:xfrm>
-            <a:off x="4525107" y="2602523"/>
-            <a:ext cx="363416" cy="257908"/>
-          </a:xfrm>
-          <a:prstGeom prst="roundRect">
-            <a:avLst/>
-          </a:prstGeom>
-          <a:solidFill>
-            <a:schemeClr val="tx1"/>
-          </a:solidFill>
-          <a:effectLst>
-            <a:outerShdw blurRad="50800" dist="38100" dir="2700000" algn="tl" rotWithShape="0">
-              <a:prstClr val="black">
-                <a:alpha val="40000"/>
-              </a:prstClr>
-            </a:outerShdw>
-          </a:effectLst>
-        </p:spPr>
-        <p:style>
-          <a:lnRef idx="2">
-            <a:schemeClr val="accent1">
-              <a:shade val="50000"/>
-            </a:schemeClr>
-          </a:lnRef>
-          <a:fillRef idx="1">
-            <a:schemeClr val="accent1"/>
-          </a:fillRef>
-          <a:effectRef idx="0">
-            <a:schemeClr val="accent1"/>
-          </a:effectRef>
-          <a:fontRef idx="minor">
-            <a:schemeClr val="lt1"/>
-          </a:fontRef>
-        </p:style>
-        <p:txBody>
-          <a:bodyPr rtlCol="0" anchor="ctr"/>
-          <a:lstStyle/>
-          <a:p>
-            <a:pPr algn="ctr"/>
-            <a:endParaRPr lang="en-US"/>
-          </a:p>
-        </p:txBody>
-      </p:sp>
-      <p:sp>
-        <p:nvSpPr>
-          <p:cNvPr id="9" name="Rectangle: Rounded Corners 8">
-            <a:extLst>
-              <a:ext uri="{FF2B5EF4-FFF2-40B4-BE49-F238E27FC236}">
-                <a16:creationId xmlns:a16="http://schemas.microsoft.com/office/drawing/2014/main" id="{4783E9D5-B586-47CC-B916-81C6BF789284}"/>
-              </a:ext>
-            </a:extLst>
-          </p:cNvPr>
-          <p:cNvSpPr/>
-          <p:nvPr/>
-        </p:nvSpPr>
-        <p:spPr>
-          <a:xfrm>
-            <a:off x="6758353" y="2602523"/>
-            <a:ext cx="363416" cy="257908"/>
-          </a:xfrm>
-          <a:prstGeom prst="roundRect">
-            <a:avLst/>
-          </a:prstGeom>
-          <a:solidFill>
-            <a:schemeClr val="tx1"/>
-          </a:solidFill>
-          <a:effectLst>
-            <a:outerShdw blurRad="50800" dist="38100" dir="2700000" algn="tl" rotWithShape="0">
-              <a:prstClr val="black">
-                <a:alpha val="40000"/>
-              </a:prstClr>
-            </a:outerShdw>
-          </a:effectLst>
-        </p:spPr>
-        <p:style>
-          <a:lnRef idx="2">
-            <a:schemeClr val="accent1">
-              <a:shade val="50000"/>
-            </a:schemeClr>
-          </a:lnRef>
-          <a:fillRef idx="1">
-            <a:schemeClr val="accent1"/>
-          </a:fillRef>
-          <a:effectRef idx="0">
-            <a:schemeClr val="accent1"/>
-          </a:effectRef>
-          <a:fontRef idx="minor">
-            <a:schemeClr val="lt1"/>
-          </a:fontRef>
-        </p:style>
-        <p:txBody>
-          <a:bodyPr rtlCol="0" anchor="ctr"/>
-          <a:lstStyle/>
-          <a:p>
-            <a:pPr algn="ctr"/>
-            <a:endParaRPr lang="en-US"/>
-          </a:p>
-        </p:txBody>
-      </p:sp>
-      <p:cxnSp>
-        <p:nvCxnSpPr>
-          <p:cNvPr id="11" name="Straight Arrow Connector 10">
-            <a:extLst>
-              <a:ext uri="{FF2B5EF4-FFF2-40B4-BE49-F238E27FC236}">
-                <a16:creationId xmlns:a16="http://schemas.microsoft.com/office/drawing/2014/main" id="{EC803BB0-B8E6-4EF1-BD16-FF2A2066BCAC}"/>
-              </a:ext>
-            </a:extLst>
-          </p:cNvPr>
-          <p:cNvCxnSpPr>
-            <a:stCxn id="8" idx="3"/>
-            <a:endCxn id="9" idx="1"/>
-          </p:cNvCxnSpPr>
-          <p:nvPr/>
-        </p:nvCxnSpPr>
-        <p:spPr>
-          <a:xfrm>
-            <a:off x="4888523" y="2731477"/>
-            <a:ext cx="1869830" cy="0"/>
-          </a:xfrm>
-          <a:prstGeom prst="straightConnector1">
-            <a:avLst/>
-          </a:prstGeom>
-          <a:ln>
+        </p:grpSpPr>
+        <p:sp>
+          <p:nvSpPr>
+            <p:cNvPr id="8" name="Rectangle: Rounded Corners 7">
+              <a:extLst>
+                <a:ext uri="{FF2B5EF4-FFF2-40B4-BE49-F238E27FC236}">
+                  <a16:creationId xmlns:a16="http://schemas.microsoft.com/office/drawing/2014/main" id="{CF590F33-0447-43A3-A608-F8719420EB17}"/>
+                </a:ext>
+              </a:extLst>
+            </p:cNvPr>
+            <p:cNvSpPr/>
+            <p:nvPr/>
+          </p:nvSpPr>
+          <p:spPr>
+            <a:xfrm>
+              <a:off x="4525107" y="2602523"/>
+              <a:ext cx="351693" cy="257908"/>
+            </a:xfrm>
+            <a:prstGeom prst="roundRect">
+              <a:avLst/>
+            </a:prstGeom>
             <a:solidFill>
-              <a:srgbClr val="00B050"/>
+              <a:schemeClr val="tx1"/>
             </a:solidFill>
-            <a:tailEnd type="triangle"/>
-          </a:ln>
-        </p:spPr>
-        <p:style>
-          <a:lnRef idx="1">
-            <a:schemeClr val="accent1"/>
-          </a:lnRef>
-          <a:fillRef idx="0">
-            <a:schemeClr val="accent1"/>
-          </a:fillRef>
-          <a:effectRef idx="0">
-            <a:schemeClr val="accent1"/>
-          </a:effectRef>
-          <a:fontRef idx="minor">
-            <a:schemeClr val="tx1"/>
-          </a:fontRef>
-        </p:style>
-      </p:cxnSp>
-      <p:sp>
-        <p:nvSpPr>
-          <p:cNvPr id="12" name="TextBox 11">
-            <a:extLst>
-              <a:ext uri="{FF2B5EF4-FFF2-40B4-BE49-F238E27FC236}">
-                <a16:creationId xmlns:a16="http://schemas.microsoft.com/office/drawing/2014/main" id="{1CDE1F8F-8311-4FD1-87DE-7E8B1C3604C8}"/>
-              </a:ext>
-            </a:extLst>
-          </p:cNvPr>
-          <p:cNvSpPr txBox="1"/>
-          <p:nvPr/>
-        </p:nvSpPr>
-        <p:spPr>
-          <a:xfrm>
-            <a:off x="5072201" y="2362145"/>
-            <a:ext cx="963212" cy="369332"/>
-          </a:xfrm>
-          <a:prstGeom prst="rect">
-            <a:avLst/>
-          </a:prstGeom>
-          <a:noFill/>
-        </p:spPr>
-        <p:txBody>
-          <a:bodyPr wrap="none" rtlCol="0">
-            <a:spAutoFit/>
-          </a:bodyPr>
-          <a:lstStyle/>
-          <a:p>
-            <a:r>
-              <a:rPr lang="en-US" dirty="0" err="1"/>
-              <a:t>MathOp</a:t>
-            </a:r>
-            <a:endParaRPr lang="en-US" dirty="0"/>
-          </a:p>
-        </p:txBody>
-      </p:sp>
-      <p:sp>
-        <p:nvSpPr>
-          <p:cNvPr id="13" name="Rectangle: Rounded Corners 12">
-            <a:extLst>
-              <a:ext uri="{FF2B5EF4-FFF2-40B4-BE49-F238E27FC236}">
-                <a16:creationId xmlns:a16="http://schemas.microsoft.com/office/drawing/2014/main" id="{C1A414C3-2F3C-40F5-9D2A-65B1680E8124}"/>
-              </a:ext>
-            </a:extLst>
-          </p:cNvPr>
-          <p:cNvSpPr/>
-          <p:nvPr/>
-        </p:nvSpPr>
-        <p:spPr>
-          <a:xfrm>
-            <a:off x="4525107" y="3470031"/>
-            <a:ext cx="363416" cy="257908"/>
-          </a:xfrm>
-          <a:prstGeom prst="roundRect">
-            <a:avLst/>
-          </a:prstGeom>
-          <a:solidFill>
-            <a:schemeClr val="tx1"/>
-          </a:solidFill>
-          <a:effectLst>
-            <a:outerShdw blurRad="50800" dist="38100" dir="2700000" algn="tl" rotWithShape="0">
-              <a:prstClr val="black">
-                <a:alpha val="40000"/>
-              </a:prstClr>
-            </a:outerShdw>
-          </a:effectLst>
-        </p:spPr>
-        <p:style>
-          <a:lnRef idx="2">
-            <a:schemeClr val="accent1">
-              <a:shade val="50000"/>
-            </a:schemeClr>
-          </a:lnRef>
-          <a:fillRef idx="1">
-            <a:schemeClr val="accent1"/>
-          </a:fillRef>
-          <a:effectRef idx="0">
-            <a:schemeClr val="accent1"/>
-          </a:effectRef>
-          <a:fontRef idx="minor">
-            <a:schemeClr val="lt1"/>
-          </a:fontRef>
-        </p:style>
-        <p:txBody>
-          <a:bodyPr rtlCol="0" anchor="ctr"/>
-          <a:lstStyle/>
-          <a:p>
-            <a:pPr algn="ctr"/>
-            <a:endParaRPr lang="en-US"/>
-          </a:p>
-        </p:txBody>
-      </p:sp>
-      <p:sp>
-        <p:nvSpPr>
-          <p:cNvPr id="14" name="Rectangle: Rounded Corners 13">
-            <a:extLst>
-              <a:ext uri="{FF2B5EF4-FFF2-40B4-BE49-F238E27FC236}">
-                <a16:creationId xmlns:a16="http://schemas.microsoft.com/office/drawing/2014/main" id="{D18B79DF-3135-408A-8267-03F82E1BA866}"/>
-              </a:ext>
-            </a:extLst>
-          </p:cNvPr>
-          <p:cNvSpPr/>
-          <p:nvPr/>
-        </p:nvSpPr>
-        <p:spPr>
-          <a:xfrm>
-            <a:off x="6746630" y="3470031"/>
-            <a:ext cx="363416" cy="257908"/>
-          </a:xfrm>
-          <a:prstGeom prst="roundRect">
-            <a:avLst/>
-          </a:prstGeom>
-          <a:solidFill>
-            <a:schemeClr val="tx1"/>
-          </a:solidFill>
-          <a:effectLst>
-            <a:outerShdw blurRad="50800" dist="38100" dir="2700000" algn="tl" rotWithShape="0">
-              <a:prstClr val="black">
-                <a:alpha val="40000"/>
-              </a:prstClr>
-            </a:outerShdw>
-          </a:effectLst>
-        </p:spPr>
-        <p:style>
-          <a:lnRef idx="2">
-            <a:schemeClr val="accent1">
-              <a:shade val="50000"/>
-            </a:schemeClr>
-          </a:lnRef>
-          <a:fillRef idx="1">
-            <a:schemeClr val="accent1"/>
-          </a:fillRef>
-          <a:effectRef idx="0">
-            <a:schemeClr val="accent1"/>
-          </a:effectRef>
-          <a:fontRef idx="minor">
-            <a:schemeClr val="lt1"/>
-          </a:fontRef>
-        </p:style>
-        <p:txBody>
-          <a:bodyPr rtlCol="0" anchor="ctr"/>
-          <a:lstStyle/>
-          <a:p>
-            <a:pPr algn="ctr"/>
-            <a:endParaRPr lang="en-US"/>
-          </a:p>
-        </p:txBody>
-      </p:sp>
-      <p:cxnSp>
-        <p:nvCxnSpPr>
-          <p:cNvPr id="15" name="Straight Arrow Connector 14">
-            <a:extLst>
-              <a:ext uri="{FF2B5EF4-FFF2-40B4-BE49-F238E27FC236}">
-                <a16:creationId xmlns:a16="http://schemas.microsoft.com/office/drawing/2014/main" id="{F13D4DBF-BB1B-4167-802C-7FED16832480}"/>
-              </a:ext>
-            </a:extLst>
-          </p:cNvPr>
-          <p:cNvCxnSpPr>
-            <a:cxnSpLocks/>
-            <a:stCxn id="14" idx="1"/>
-            <a:endCxn id="13" idx="3"/>
-          </p:cNvCxnSpPr>
-          <p:nvPr/>
-        </p:nvCxnSpPr>
-        <p:spPr>
-          <a:xfrm flipH="1">
-            <a:off x="4888523" y="3598985"/>
-            <a:ext cx="1858107" cy="0"/>
-          </a:xfrm>
-          <a:prstGeom prst="straightConnector1">
-            <a:avLst/>
-          </a:prstGeom>
-          <a:ln>
+            <a:effectLst>
+              <a:outerShdw blurRad="50800" dist="38100" dir="2700000" algn="tl" rotWithShape="0">
+                <a:prstClr val="black">
+                  <a:alpha val="40000"/>
+                </a:prstClr>
+              </a:outerShdw>
+            </a:effectLst>
+          </p:spPr>
+          <p:style>
+            <a:lnRef idx="2">
+              <a:schemeClr val="accent1">
+                <a:shade val="50000"/>
+              </a:schemeClr>
+            </a:lnRef>
+            <a:fillRef idx="1">
+              <a:schemeClr val="accent1"/>
+            </a:fillRef>
+            <a:effectRef idx="0">
+              <a:schemeClr val="accent1"/>
+            </a:effectRef>
+            <a:fontRef idx="minor">
+              <a:schemeClr val="lt1"/>
+            </a:fontRef>
+          </p:style>
+          <p:txBody>
+            <a:bodyPr rtlCol="0" anchor="ctr"/>
+            <a:lstStyle/>
+            <a:p>
+              <a:pPr algn="ctr"/>
+              <a:endParaRPr lang="en-US"/>
+            </a:p>
+          </p:txBody>
+        </p:sp>
+        <p:sp>
+          <p:nvSpPr>
+            <p:cNvPr id="9" name="Rectangle: Rounded Corners 8">
+              <a:extLst>
+                <a:ext uri="{FF2B5EF4-FFF2-40B4-BE49-F238E27FC236}">
+                  <a16:creationId xmlns:a16="http://schemas.microsoft.com/office/drawing/2014/main" id="{4783E9D5-B586-47CC-B916-81C6BF789284}"/>
+                </a:ext>
+              </a:extLst>
+            </p:cNvPr>
+            <p:cNvSpPr/>
+            <p:nvPr/>
+          </p:nvSpPr>
+          <p:spPr>
+            <a:xfrm>
+              <a:off x="6758353" y="2602523"/>
+              <a:ext cx="363416" cy="257908"/>
+            </a:xfrm>
+            <a:prstGeom prst="roundRect">
+              <a:avLst/>
+            </a:prstGeom>
             <a:solidFill>
-              <a:srgbClr val="00B050"/>
+              <a:schemeClr val="tx1"/>
             </a:solidFill>
-            <a:tailEnd type="triangle"/>
-          </a:ln>
-        </p:spPr>
-        <p:style>
-          <a:lnRef idx="1">
-            <a:schemeClr val="accent1"/>
-          </a:lnRef>
-          <a:fillRef idx="0">
-            <a:schemeClr val="accent1"/>
-          </a:fillRef>
-          <a:effectRef idx="0">
-            <a:schemeClr val="accent1"/>
-          </a:effectRef>
-          <a:fontRef idx="minor">
-            <a:schemeClr val="tx1"/>
-          </a:fontRef>
-        </p:style>
-      </p:cxnSp>
-      <p:sp>
-        <p:nvSpPr>
-          <p:cNvPr id="18" name="TextBox 17">
-            <a:extLst>
-              <a:ext uri="{FF2B5EF4-FFF2-40B4-BE49-F238E27FC236}">
-                <a16:creationId xmlns:a16="http://schemas.microsoft.com/office/drawing/2014/main" id="{386F18B0-4CC9-4A65-A08F-06817FD23F2D}"/>
-              </a:ext>
-            </a:extLst>
-          </p:cNvPr>
-          <p:cNvSpPr txBox="1"/>
-          <p:nvPr/>
-        </p:nvSpPr>
-        <p:spPr>
-          <a:xfrm>
-            <a:off x="5081019" y="3229652"/>
-            <a:ext cx="1266950" cy="369332"/>
-          </a:xfrm>
-          <a:prstGeom prst="rect">
-            <a:avLst/>
-          </a:prstGeom>
-          <a:noFill/>
-        </p:spPr>
-        <p:txBody>
-          <a:bodyPr wrap="none" rtlCol="0">
-            <a:spAutoFit/>
-          </a:bodyPr>
-          <a:lstStyle/>
-          <a:p>
-            <a:r>
-              <a:rPr lang="en-US" dirty="0" err="1"/>
-              <a:t>MathResult</a:t>
-            </a:r>
-            <a:endParaRPr lang="en-US" dirty="0"/>
-          </a:p>
-        </p:txBody>
-      </p:sp>
+            <a:effectLst>
+              <a:outerShdw blurRad="50800" dist="38100" dir="2700000" algn="tl" rotWithShape="0">
+                <a:prstClr val="black">
+                  <a:alpha val="40000"/>
+                </a:prstClr>
+              </a:outerShdw>
+            </a:effectLst>
+          </p:spPr>
+          <p:style>
+            <a:lnRef idx="2">
+              <a:schemeClr val="accent1">
+                <a:shade val="50000"/>
+              </a:schemeClr>
+            </a:lnRef>
+            <a:fillRef idx="1">
+              <a:schemeClr val="accent1"/>
+            </a:fillRef>
+            <a:effectRef idx="0">
+              <a:schemeClr val="accent1"/>
+            </a:effectRef>
+            <a:fontRef idx="minor">
+              <a:schemeClr val="lt1"/>
+            </a:fontRef>
+          </p:style>
+          <p:txBody>
+            <a:bodyPr rtlCol="0" anchor="ctr"/>
+            <a:lstStyle/>
+            <a:p>
+              <a:pPr algn="ctr"/>
+              <a:endParaRPr lang="en-US"/>
+            </a:p>
+          </p:txBody>
+        </p:sp>
+        <p:cxnSp>
+          <p:nvCxnSpPr>
+            <p:cNvPr id="11" name="Straight Arrow Connector 10">
+              <a:extLst>
+                <a:ext uri="{FF2B5EF4-FFF2-40B4-BE49-F238E27FC236}">
+                  <a16:creationId xmlns:a16="http://schemas.microsoft.com/office/drawing/2014/main" id="{EC803BB0-B8E6-4EF1-BD16-FF2A2066BCAC}"/>
+                </a:ext>
+              </a:extLst>
+            </p:cNvPr>
+            <p:cNvCxnSpPr>
+              <a:cxnSpLocks/>
+              <a:stCxn id="8" idx="3"/>
+              <a:endCxn id="9" idx="1"/>
+            </p:cNvCxnSpPr>
+            <p:nvPr/>
+          </p:nvCxnSpPr>
+          <p:spPr>
+            <a:xfrm>
+              <a:off x="4876800" y="2731477"/>
+              <a:ext cx="1881553" cy="0"/>
+            </a:xfrm>
+            <a:prstGeom prst="straightConnector1">
+              <a:avLst/>
+            </a:prstGeom>
+            <a:ln>
+              <a:solidFill>
+                <a:srgbClr val="00B050"/>
+              </a:solidFill>
+              <a:tailEnd type="triangle"/>
+            </a:ln>
+          </p:spPr>
+          <p:style>
+            <a:lnRef idx="1">
+              <a:schemeClr val="accent1"/>
+            </a:lnRef>
+            <a:fillRef idx="0">
+              <a:schemeClr val="accent1"/>
+            </a:fillRef>
+            <a:effectRef idx="0">
+              <a:schemeClr val="accent1"/>
+            </a:effectRef>
+            <a:fontRef idx="minor">
+              <a:schemeClr val="tx1"/>
+            </a:fontRef>
+          </p:style>
+        </p:cxnSp>
+        <p:sp>
+          <p:nvSpPr>
+            <p:cNvPr id="12" name="TextBox 11">
+              <a:extLst>
+                <a:ext uri="{FF2B5EF4-FFF2-40B4-BE49-F238E27FC236}">
+                  <a16:creationId xmlns:a16="http://schemas.microsoft.com/office/drawing/2014/main" id="{1CDE1F8F-8311-4FD1-87DE-7E8B1C3604C8}"/>
+                </a:ext>
+              </a:extLst>
+            </p:cNvPr>
+            <p:cNvSpPr txBox="1"/>
+            <p:nvPr/>
+          </p:nvSpPr>
+          <p:spPr>
+            <a:xfrm>
+              <a:off x="4888523" y="2362145"/>
+              <a:ext cx="1869830" cy="369332"/>
+            </a:xfrm>
+            <a:prstGeom prst="rect">
+              <a:avLst/>
+            </a:prstGeom>
+            <a:noFill/>
+          </p:spPr>
+          <p:txBody>
+            <a:bodyPr wrap="square" rtlCol="0">
+              <a:spAutoFit/>
+            </a:bodyPr>
+            <a:lstStyle/>
+            <a:p>
+              <a:pPr algn="ctr"/>
+              <a:r>
+                <a:rPr lang="en-US" dirty="0"/>
+                <a:t>MathOp</a:t>
+              </a:r>
+            </a:p>
+          </p:txBody>
+        </p:sp>
+        <p:sp>
+          <p:nvSpPr>
+            <p:cNvPr id="13" name="Rectangle: Rounded Corners 12">
+              <a:extLst>
+                <a:ext uri="{FF2B5EF4-FFF2-40B4-BE49-F238E27FC236}">
+                  <a16:creationId xmlns:a16="http://schemas.microsoft.com/office/drawing/2014/main" id="{C1A414C3-2F3C-40F5-9D2A-65B1680E8124}"/>
+                </a:ext>
+              </a:extLst>
+            </p:cNvPr>
+            <p:cNvSpPr/>
+            <p:nvPr/>
+          </p:nvSpPr>
+          <p:spPr>
+            <a:xfrm>
+              <a:off x="4525107" y="3470031"/>
+              <a:ext cx="363416" cy="257908"/>
+            </a:xfrm>
+            <a:prstGeom prst="roundRect">
+              <a:avLst/>
+            </a:prstGeom>
+            <a:solidFill>
+              <a:schemeClr val="tx1"/>
+            </a:solidFill>
+            <a:effectLst>
+              <a:outerShdw blurRad="50800" dist="38100" dir="2700000" algn="tl" rotWithShape="0">
+                <a:prstClr val="black">
+                  <a:alpha val="40000"/>
+                </a:prstClr>
+              </a:outerShdw>
+            </a:effectLst>
+          </p:spPr>
+          <p:style>
+            <a:lnRef idx="2">
+              <a:schemeClr val="accent1">
+                <a:shade val="50000"/>
+              </a:schemeClr>
+            </a:lnRef>
+            <a:fillRef idx="1">
+              <a:schemeClr val="accent1"/>
+            </a:fillRef>
+            <a:effectRef idx="0">
+              <a:schemeClr val="accent1"/>
+            </a:effectRef>
+            <a:fontRef idx="minor">
+              <a:schemeClr val="lt1"/>
+            </a:fontRef>
+          </p:style>
+          <p:txBody>
+            <a:bodyPr rtlCol="0" anchor="ctr"/>
+            <a:lstStyle/>
+            <a:p>
+              <a:pPr algn="ctr"/>
+              <a:endParaRPr lang="en-US"/>
+            </a:p>
+          </p:txBody>
+        </p:sp>
+        <p:sp>
+          <p:nvSpPr>
+            <p:cNvPr id="14" name="Rectangle: Rounded Corners 13">
+              <a:extLst>
+                <a:ext uri="{FF2B5EF4-FFF2-40B4-BE49-F238E27FC236}">
+                  <a16:creationId xmlns:a16="http://schemas.microsoft.com/office/drawing/2014/main" id="{D18B79DF-3135-408A-8267-03F82E1BA866}"/>
+                </a:ext>
+              </a:extLst>
+            </p:cNvPr>
+            <p:cNvSpPr/>
+            <p:nvPr/>
+          </p:nvSpPr>
+          <p:spPr>
+            <a:xfrm>
+              <a:off x="6746630" y="3470031"/>
+              <a:ext cx="363416" cy="257908"/>
+            </a:xfrm>
+            <a:prstGeom prst="roundRect">
+              <a:avLst/>
+            </a:prstGeom>
+            <a:solidFill>
+              <a:schemeClr val="tx1"/>
+            </a:solidFill>
+            <a:effectLst>
+              <a:outerShdw blurRad="50800" dist="38100" dir="2700000" algn="tl" rotWithShape="0">
+                <a:prstClr val="black">
+                  <a:alpha val="40000"/>
+                </a:prstClr>
+              </a:outerShdw>
+            </a:effectLst>
+          </p:spPr>
+          <p:style>
+            <a:lnRef idx="2">
+              <a:schemeClr val="accent1">
+                <a:shade val="50000"/>
+              </a:schemeClr>
+            </a:lnRef>
+            <a:fillRef idx="1">
+              <a:schemeClr val="accent1"/>
+            </a:fillRef>
+            <a:effectRef idx="0">
+              <a:schemeClr val="accent1"/>
+            </a:effectRef>
+            <a:fontRef idx="minor">
+              <a:schemeClr val="lt1"/>
+            </a:fontRef>
+          </p:style>
+          <p:txBody>
+            <a:bodyPr rtlCol="0" anchor="ctr"/>
+            <a:lstStyle/>
+            <a:p>
+              <a:pPr algn="ctr"/>
+              <a:endParaRPr lang="en-US"/>
+            </a:p>
+          </p:txBody>
+        </p:sp>
+        <p:cxnSp>
+          <p:nvCxnSpPr>
+            <p:cNvPr id="15" name="Straight Arrow Connector 14">
+              <a:extLst>
+                <a:ext uri="{FF2B5EF4-FFF2-40B4-BE49-F238E27FC236}">
+                  <a16:creationId xmlns:a16="http://schemas.microsoft.com/office/drawing/2014/main" id="{F13D4DBF-BB1B-4167-802C-7FED16832480}"/>
+                </a:ext>
+              </a:extLst>
+            </p:cNvPr>
+            <p:cNvCxnSpPr>
+              <a:cxnSpLocks/>
+              <a:stCxn id="14" idx="1"/>
+              <a:endCxn id="13" idx="3"/>
+            </p:cNvCxnSpPr>
+            <p:nvPr/>
+          </p:nvCxnSpPr>
+          <p:spPr>
+            <a:xfrm flipH="1">
+              <a:off x="4888523" y="3598985"/>
+              <a:ext cx="1858107" cy="0"/>
+            </a:xfrm>
+            <a:prstGeom prst="straightConnector1">
+              <a:avLst/>
+            </a:prstGeom>
+            <a:ln>
+              <a:solidFill>
+                <a:srgbClr val="00B050"/>
+              </a:solidFill>
+              <a:tailEnd type="triangle"/>
+            </a:ln>
+          </p:spPr>
+          <p:style>
+            <a:lnRef idx="1">
+              <a:schemeClr val="accent1"/>
+            </a:lnRef>
+            <a:fillRef idx="0">
+              <a:schemeClr val="accent1"/>
+            </a:fillRef>
+            <a:effectRef idx="0">
+              <a:schemeClr val="accent1"/>
+            </a:effectRef>
+            <a:fontRef idx="minor">
+              <a:schemeClr val="tx1"/>
+            </a:fontRef>
+          </p:style>
+        </p:cxnSp>
+        <p:sp>
+          <p:nvSpPr>
+            <p:cNvPr id="18" name="TextBox 17">
+              <a:extLst>
+                <a:ext uri="{FF2B5EF4-FFF2-40B4-BE49-F238E27FC236}">
+                  <a16:creationId xmlns:a16="http://schemas.microsoft.com/office/drawing/2014/main" id="{386F18B0-4CC9-4A65-A08F-06817FD23F2D}"/>
+                </a:ext>
+              </a:extLst>
+            </p:cNvPr>
+            <p:cNvSpPr txBox="1"/>
+            <p:nvPr/>
+          </p:nvSpPr>
+          <p:spPr>
+            <a:xfrm>
+              <a:off x="4888524" y="3229652"/>
+              <a:ext cx="1858106" cy="369332"/>
+            </a:xfrm>
+            <a:prstGeom prst="rect">
+              <a:avLst/>
+            </a:prstGeom>
+            <a:noFill/>
+          </p:spPr>
+          <p:txBody>
+            <a:bodyPr wrap="square" rtlCol="0">
+              <a:spAutoFit/>
+            </a:bodyPr>
+            <a:lstStyle/>
+            <a:p>
+              <a:pPr algn="ctr"/>
+              <a:r>
+                <a:rPr lang="en-US" dirty="0"/>
+                <a:t>MathResult</a:t>
+              </a:r>
+            </a:p>
+          </p:txBody>
+        </p:sp>
+      </p:grpSp>
     </p:spTree>
     <p:extLst>
       <p:ext uri="{BB962C8B-B14F-4D97-AF65-F5344CB8AC3E}">

</xml_diff>